<commit_message>
Updated market reports for Q2
</commit_message>
<xml_diff>
--- a/marketing/marketreports/industrial_snapshot_template.pptx
+++ b/marketing/marketreports/industrial_snapshot_template.pptx
@@ -142,7 +142,7 @@
 <file path=ppt/revisionInfo.xml><?xml version="1.0" encoding="utf-8"?>
 <p1510:revInfo xmlns:a="http://schemas.openxmlformats.org/drawingml/2006/main" xmlns:r="http://schemas.openxmlformats.org/officeDocument/2006/relationships" xmlns:p1510="http://schemas.microsoft.com/office/powerpoint/2015/10/main">
   <p1510:revLst>
-    <p1510:client id="{081B2901-91DF-2348-8C9D-3498FB649D76}" v="23" dt="2020-06-25T15:33:50.831"/>
+    <p1510:client id="{4BD5E4C1-7AC0-494F-812D-8F4E8ADC387C}" v="2" dt="2020-07-13T14:56:57.715"/>
   </p1510:revLst>
 </p1510:revInfo>
 </file>
@@ -164,6 +164,30 @@
         </pc:sldMkLst>
         <pc:graphicFrameChg chg="mod">
           <ac:chgData name="Andrew Schnitkey" userId="4f2f6332d690fb8f" providerId="LiveId" clId="{081B2901-91DF-2348-8C9D-3498FB649D76}" dt="2020-06-25T15:33:50.831" v="17" actId="5736"/>
+          <ac:graphicFrameMkLst>
+            <pc:docMk/>
+            <pc:sldMk cId="769240779" sldId="3309"/>
+            <ac:graphicFrameMk id="2" creationId="{AE554B24-EC4F-6245-BAC1-E1ED0E9FC0C4}"/>
+          </ac:graphicFrameMkLst>
+        </pc:graphicFrameChg>
+      </pc:sldChg>
+    </pc:docChg>
+  </pc:docChgLst>
+  <pc:docChgLst>
+    <pc:chgData name="Andrew Schnitkey" userId="4f2f6332d690fb8f" providerId="LiveId" clId="{4BD5E4C1-7AC0-494F-812D-8F4E8ADC387C}"/>
+    <pc:docChg chg="modSld">
+      <pc:chgData name="Andrew Schnitkey" userId="4f2f6332d690fb8f" providerId="LiveId" clId="{4BD5E4C1-7AC0-494F-812D-8F4E8ADC387C}" dt="2020-07-13T14:56:57.715" v="6" actId="5736"/>
+      <pc:docMkLst>
+        <pc:docMk/>
+      </pc:docMkLst>
+      <pc:sldChg chg="modSp mod">
+        <pc:chgData name="Andrew Schnitkey" userId="4f2f6332d690fb8f" providerId="LiveId" clId="{4BD5E4C1-7AC0-494F-812D-8F4E8ADC387C}" dt="2020-07-13T14:56:57.715" v="6" actId="5736"/>
+        <pc:sldMkLst>
+          <pc:docMk/>
+          <pc:sldMk cId="769240779" sldId="3309"/>
+        </pc:sldMkLst>
+        <pc:graphicFrameChg chg="mod">
+          <ac:chgData name="Andrew Schnitkey" userId="4f2f6332d690fb8f" providerId="LiveId" clId="{4BD5E4C1-7AC0-494F-812D-8F4E8ADC387C}" dt="2020-07-13T14:56:57.715" v="6" actId="5736"/>
           <ac:graphicFrameMkLst>
             <pc:docMk/>
             <pc:sldMk cId="769240779" sldId="3309"/>
@@ -237,19 +261,19 @@
               <c:strCache>
                 <c:ptCount val="5"/>
                 <c:pt idx="0">
-                  <c:v>Q1 2019</c:v>
+                  <c:v>Q2 2019</c:v>
                 </c:pt>
                 <c:pt idx="1">
-                  <c:v>Q2 2019</c:v>
+                  <c:v>Q3 2019</c:v>
                 </c:pt>
                 <c:pt idx="2">
-                  <c:v>Q3 2019</c:v>
+                  <c:v>Q4 2019</c:v>
                 </c:pt>
                 <c:pt idx="3">
-                  <c:v>Q4 2019</c:v>
+                  <c:v>Q1 2020</c:v>
                 </c:pt>
                 <c:pt idx="4">
-                  <c:v>Q1 2020</c:v>
+                  <c:v>Q2 2020</c:v>
                 </c:pt>
               </c:strCache>
             </c:strRef>
@@ -261,19 +285,19 @@
                 <c:formatCode>General</c:formatCode>
                 <c:ptCount val="5"/>
                 <c:pt idx="0">
-                  <c:v>-198000</c:v>
+                  <c:v>1300000</c:v>
                 </c:pt>
                 <c:pt idx="1">
-                  <c:v>1300000</c:v>
+                  <c:v>-2400000</c:v>
                 </c:pt>
                 <c:pt idx="2">
-                  <c:v>-2400000</c:v>
+                  <c:v>-87157</c:v>
                 </c:pt>
                 <c:pt idx="3">
-                  <c:v>-87157</c:v>
+                  <c:v>130000</c:v>
                 </c:pt>
                 <c:pt idx="4">
-                  <c:v>130000</c:v>
+                  <c:v>-538000</c:v>
                 </c:pt>
               </c:numCache>
             </c:numRef>
@@ -332,19 +356,19 @@
               <c:strCache>
                 <c:ptCount val="5"/>
                 <c:pt idx="0">
-                  <c:v>Q1 2019</c:v>
+                  <c:v>Q2 2019</c:v>
                 </c:pt>
                 <c:pt idx="1">
-                  <c:v>Q2 2019</c:v>
+                  <c:v>Q3 2019</c:v>
                 </c:pt>
                 <c:pt idx="2">
-                  <c:v>Q3 2019</c:v>
+                  <c:v>Q4 2019</c:v>
                 </c:pt>
                 <c:pt idx="3">
-                  <c:v>Q4 2019</c:v>
+                  <c:v>Q1 2020</c:v>
                 </c:pt>
                 <c:pt idx="4">
-                  <c:v>Q1 2020</c:v>
+                  <c:v>Q2 2020</c:v>
                 </c:pt>
               </c:strCache>
             </c:strRef>
@@ -356,19 +380,19 @@
                 <c:formatCode>0.00%</c:formatCode>
                 <c:ptCount val="5"/>
                 <c:pt idx="0">
-                  <c:v>4.2999999999999997E-2</c:v>
+                  <c:v>4.4999999999999998E-2</c:v>
                 </c:pt>
                 <c:pt idx="1">
-                  <c:v>4.4999999999999998E-2</c:v>
+                  <c:v>0.05</c:v>
                 </c:pt>
                 <c:pt idx="2">
                   <c:v>0.05</c:v>
                 </c:pt>
                 <c:pt idx="3">
-                  <c:v>0.05</c:v>
+                  <c:v>5.3999999999999999E-2</c:v>
                 </c:pt>
                 <c:pt idx="4">
-                  <c:v>5.3999999999999999E-2</c:v>
+                  <c:v>6.6000000000000003E-2</c:v>
                 </c:pt>
               </c:numCache>
             </c:numRef>
@@ -494,7 +518,7 @@
         <c:axId val="654996592"/>
         <c:scaling>
           <c:orientation val="minMax"/>
-          <c:max val="6.0000000000000012E-2"/>
+          <c:max val="7.0000000000000007E-2"/>
           <c:min val="4.0000000000000008E-2"/>
         </c:scaling>
         <c:delete val="0"/>
@@ -655,7 +679,7 @@
             <a:fld id="{EFC10EE1-B198-C942-8235-326C972CBB30}" type="datetimeFigureOut">
               <a:rPr lang="en-US" smtClean="0"/>
               <a:pPr/>
-              <a:t>6/25/20</a:t>
+              <a:t>7/13/20</a:t>
             </a:fld>
             <a:endParaRPr lang="en-US" dirty="0"/>
           </a:p>
@@ -1535,7 +1559,7 @@
           <p:nvPr>
             <p:extLst>
               <p:ext uri="{D42A27DB-BD31-4B8C-83A1-F6EECF244321}">
-                <p14:modId xmlns:p14="http://schemas.microsoft.com/office/powerpoint/2010/main" val="844522093"/>
+                <p14:modId xmlns:p14="http://schemas.microsoft.com/office/powerpoint/2010/main" val="1159411804"/>
               </p:ext>
             </p:extLst>
           </p:nvPr>

</xml_diff>

<commit_message>
Updated market snapshots on service pages
</commit_message>
<xml_diff>
--- a/marketing/marketreports/industrial_snapshot_template.pptx
+++ b/marketing/marketreports/industrial_snapshot_template.pptx
@@ -142,7 +142,7 @@
 <file path=ppt/revisionInfo.xml><?xml version="1.0" encoding="utf-8"?>
 <p1510:revInfo xmlns:a="http://schemas.openxmlformats.org/drawingml/2006/main" xmlns:r="http://schemas.openxmlformats.org/officeDocument/2006/relationships" xmlns:p1510="http://schemas.microsoft.com/office/powerpoint/2015/10/main">
   <p1510:revLst>
-    <p1510:client id="{4BD5E4C1-7AC0-494F-812D-8F4E8ADC387C}" v="2" dt="2020-07-13T14:56:57.715"/>
+    <p1510:client id="{4BD5E4C1-7AC0-494F-812D-8F4E8ADC387C}" v="9" dt="2020-10-19T19:12:16.202"/>
   </p1510:revLst>
 </p1510:revInfo>
 </file>
@@ -176,18 +176,18 @@
   <pc:docChgLst>
     <pc:chgData name="Andrew Schnitkey" userId="4f2f6332d690fb8f" providerId="LiveId" clId="{4BD5E4C1-7AC0-494F-812D-8F4E8ADC387C}"/>
     <pc:docChg chg="modSld">
-      <pc:chgData name="Andrew Schnitkey" userId="4f2f6332d690fb8f" providerId="LiveId" clId="{4BD5E4C1-7AC0-494F-812D-8F4E8ADC387C}" dt="2020-07-13T14:56:57.715" v="6" actId="5736"/>
+      <pc:chgData name="Andrew Schnitkey" userId="4f2f6332d690fb8f" providerId="LiveId" clId="{4BD5E4C1-7AC0-494F-812D-8F4E8ADC387C}" dt="2020-10-19T19:12:16.202" v="13" actId="5736"/>
       <pc:docMkLst>
         <pc:docMk/>
       </pc:docMkLst>
       <pc:sldChg chg="modSp mod">
-        <pc:chgData name="Andrew Schnitkey" userId="4f2f6332d690fb8f" providerId="LiveId" clId="{4BD5E4C1-7AC0-494F-812D-8F4E8ADC387C}" dt="2020-07-13T14:56:57.715" v="6" actId="5736"/>
+        <pc:chgData name="Andrew Schnitkey" userId="4f2f6332d690fb8f" providerId="LiveId" clId="{4BD5E4C1-7AC0-494F-812D-8F4E8ADC387C}" dt="2020-10-19T19:12:16.202" v="13" actId="5736"/>
         <pc:sldMkLst>
           <pc:docMk/>
           <pc:sldMk cId="769240779" sldId="3309"/>
         </pc:sldMkLst>
         <pc:graphicFrameChg chg="mod">
-          <ac:chgData name="Andrew Schnitkey" userId="4f2f6332d690fb8f" providerId="LiveId" clId="{4BD5E4C1-7AC0-494F-812D-8F4E8ADC387C}" dt="2020-07-13T14:56:57.715" v="6" actId="5736"/>
+          <ac:chgData name="Andrew Schnitkey" userId="4f2f6332d690fb8f" providerId="LiveId" clId="{4BD5E4C1-7AC0-494F-812D-8F4E8ADC387C}" dt="2020-10-19T19:12:16.202" v="13" actId="5736"/>
           <ac:graphicFrameMkLst>
             <pc:docMk/>
             <pc:sldMk cId="769240779" sldId="3309"/>
@@ -261,19 +261,19 @@
               <c:strCache>
                 <c:ptCount val="5"/>
                 <c:pt idx="0">
-                  <c:v>Q2 2019</c:v>
+                  <c:v>Q3 2019</c:v>
                 </c:pt>
                 <c:pt idx="1">
-                  <c:v>Q3 2019</c:v>
+                  <c:v>Q4 2019</c:v>
                 </c:pt>
                 <c:pt idx="2">
-                  <c:v>Q4 2019</c:v>
+                  <c:v>Q1 2020</c:v>
                 </c:pt>
                 <c:pt idx="3">
-                  <c:v>Q1 2020</c:v>
+                  <c:v>Q2 2020</c:v>
                 </c:pt>
                 <c:pt idx="4">
-                  <c:v>Q2 2020</c:v>
+                  <c:v>Q3 2020</c:v>
                 </c:pt>
               </c:strCache>
             </c:strRef>
@@ -285,19 +285,19 @@
                 <c:formatCode>General</c:formatCode>
                 <c:ptCount val="5"/>
                 <c:pt idx="0">
-                  <c:v>1300000</c:v>
+                  <c:v>-2400000</c:v>
                 </c:pt>
                 <c:pt idx="1">
-                  <c:v>-2400000</c:v>
+                  <c:v>-87157</c:v>
                 </c:pt>
                 <c:pt idx="2">
-                  <c:v>-87157</c:v>
+                  <c:v>130000</c:v>
                 </c:pt>
                 <c:pt idx="3">
-                  <c:v>130000</c:v>
+                  <c:v>-538000</c:v>
                 </c:pt>
                 <c:pt idx="4">
-                  <c:v>-538000</c:v>
+                  <c:v>-464000</c:v>
                 </c:pt>
               </c:numCache>
             </c:numRef>
@@ -356,19 +356,19 @@
               <c:strCache>
                 <c:ptCount val="5"/>
                 <c:pt idx="0">
-                  <c:v>Q2 2019</c:v>
+                  <c:v>Q3 2019</c:v>
                 </c:pt>
                 <c:pt idx="1">
-                  <c:v>Q3 2019</c:v>
+                  <c:v>Q4 2019</c:v>
                 </c:pt>
                 <c:pt idx="2">
-                  <c:v>Q4 2019</c:v>
+                  <c:v>Q1 2020</c:v>
                 </c:pt>
                 <c:pt idx="3">
-                  <c:v>Q1 2020</c:v>
+                  <c:v>Q2 2020</c:v>
                 </c:pt>
                 <c:pt idx="4">
-                  <c:v>Q2 2020</c:v>
+                  <c:v>Q3 2020</c:v>
                 </c:pt>
               </c:strCache>
             </c:strRef>
@@ -380,19 +380,19 @@
                 <c:formatCode>0.00%</c:formatCode>
                 <c:ptCount val="5"/>
                 <c:pt idx="0">
-                  <c:v>4.4999999999999998E-2</c:v>
+                  <c:v>0.05</c:v>
                 </c:pt>
                 <c:pt idx="1">
                   <c:v>0.05</c:v>
                 </c:pt>
                 <c:pt idx="2">
-                  <c:v>0.05</c:v>
+                  <c:v>5.3999999999999999E-2</c:v>
                 </c:pt>
                 <c:pt idx="3">
-                  <c:v>5.3999999999999999E-2</c:v>
+                  <c:v>6.6000000000000003E-2</c:v>
                 </c:pt>
                 <c:pt idx="4">
-                  <c:v>6.6000000000000003E-2</c:v>
+                  <c:v>7.0999999999999994E-2</c:v>
                 </c:pt>
               </c:numCache>
             </c:numRef>
@@ -518,8 +518,8 @@
         <c:axId val="654996592"/>
         <c:scaling>
           <c:orientation val="minMax"/>
-          <c:max val="7.0000000000000007E-2"/>
-          <c:min val="4.0000000000000008E-2"/>
+          <c:max val="7.5000000000000011E-2"/>
+          <c:min val="4.5000000000000012E-2"/>
         </c:scaling>
         <c:delete val="0"/>
         <c:axPos val="r"/>
@@ -679,7 +679,7 @@
             <a:fld id="{EFC10EE1-B198-C942-8235-326C972CBB30}" type="datetimeFigureOut">
               <a:rPr lang="en-US" smtClean="0"/>
               <a:pPr/>
-              <a:t>7/13/20</a:t>
+              <a:t>10/19/20</a:t>
             </a:fld>
             <a:endParaRPr lang="en-US" dirty="0"/>
           </a:p>
@@ -1559,7 +1559,7 @@
           <p:nvPr>
             <p:extLst>
               <p:ext uri="{D42A27DB-BD31-4B8C-83A1-F6EECF244321}">
-                <p14:modId xmlns:p14="http://schemas.microsoft.com/office/powerpoint/2010/main" val="1159411804"/>
+                <p14:modId xmlns:p14="http://schemas.microsoft.com/office/powerpoint/2010/main" val="3281548069"/>
               </p:ext>
             </p:extLst>
           </p:nvPr>

</xml_diff>

<commit_message>
Updated Market Snapshots on services pages
</commit_message>
<xml_diff>
--- a/marketing/marketreports/industrial_snapshot_template.pptx
+++ b/marketing/marketreports/industrial_snapshot_template.pptx
@@ -150,6 +150,30 @@
 <file path=ppt/changesInfos/changesInfo1.xml><?xml version="1.0" encoding="utf-8"?>
 <pc:chgInfo xmlns:a="http://schemas.openxmlformats.org/drawingml/2006/main" xmlns:r="http://schemas.openxmlformats.org/officeDocument/2006/relationships" xmlns:ac="http://schemas.microsoft.com/office/drawing/2013/main/command" xmlns:pc="http://schemas.microsoft.com/office/powerpoint/2013/main/command">
   <pc:docChgLst>
+    <pc:chgData name="Andrew Schnitkey" userId="4f2f6332d690fb8f" providerId="LiveId" clId="{4BD5E4C1-7AC0-494F-812D-8F4E8ADC387C}"/>
+    <pc:docChg chg="modSld">
+      <pc:chgData name="Andrew Schnitkey" userId="4f2f6332d690fb8f" providerId="LiveId" clId="{4BD5E4C1-7AC0-494F-812D-8F4E8ADC387C}" dt="2020-10-19T19:12:16.202" v="13" actId="5736"/>
+      <pc:docMkLst>
+        <pc:docMk/>
+      </pc:docMkLst>
+      <pc:sldChg chg="modSp mod">
+        <pc:chgData name="Andrew Schnitkey" userId="4f2f6332d690fb8f" providerId="LiveId" clId="{4BD5E4C1-7AC0-494F-812D-8F4E8ADC387C}" dt="2020-10-19T19:12:16.202" v="13" actId="5736"/>
+        <pc:sldMkLst>
+          <pc:docMk/>
+          <pc:sldMk cId="769240779" sldId="3309"/>
+        </pc:sldMkLst>
+        <pc:graphicFrameChg chg="mod">
+          <ac:chgData name="Andrew Schnitkey" userId="4f2f6332d690fb8f" providerId="LiveId" clId="{4BD5E4C1-7AC0-494F-812D-8F4E8ADC387C}" dt="2020-10-19T19:12:16.202" v="13" actId="5736"/>
+          <ac:graphicFrameMkLst>
+            <pc:docMk/>
+            <pc:sldMk cId="769240779" sldId="3309"/>
+            <ac:graphicFrameMk id="2" creationId="{AE554B24-EC4F-6245-BAC1-E1ED0E9FC0C4}"/>
+          </ac:graphicFrameMkLst>
+        </pc:graphicFrameChg>
+      </pc:sldChg>
+    </pc:docChg>
+  </pc:docChgLst>
+  <pc:docChgLst>
     <pc:chgData name="Andrew Schnitkey" userId="4f2f6332d690fb8f" providerId="LiveId" clId="{081B2901-91DF-2348-8C9D-3498FB649D76}"/>
     <pc:docChg chg="modSld">
       <pc:chgData name="Andrew Schnitkey" userId="4f2f6332d690fb8f" providerId="LiveId" clId="{081B2901-91DF-2348-8C9D-3498FB649D76}" dt="2020-06-25T15:33:50.831" v="17" actId="5736"/>
@@ -164,30 +188,6 @@
         </pc:sldMkLst>
         <pc:graphicFrameChg chg="mod">
           <ac:chgData name="Andrew Schnitkey" userId="4f2f6332d690fb8f" providerId="LiveId" clId="{081B2901-91DF-2348-8C9D-3498FB649D76}" dt="2020-06-25T15:33:50.831" v="17" actId="5736"/>
-          <ac:graphicFrameMkLst>
-            <pc:docMk/>
-            <pc:sldMk cId="769240779" sldId="3309"/>
-            <ac:graphicFrameMk id="2" creationId="{AE554B24-EC4F-6245-BAC1-E1ED0E9FC0C4}"/>
-          </ac:graphicFrameMkLst>
-        </pc:graphicFrameChg>
-      </pc:sldChg>
-    </pc:docChg>
-  </pc:docChgLst>
-  <pc:docChgLst>
-    <pc:chgData name="Andrew Schnitkey" userId="4f2f6332d690fb8f" providerId="LiveId" clId="{4BD5E4C1-7AC0-494F-812D-8F4E8ADC387C}"/>
-    <pc:docChg chg="modSld">
-      <pc:chgData name="Andrew Schnitkey" userId="4f2f6332d690fb8f" providerId="LiveId" clId="{4BD5E4C1-7AC0-494F-812D-8F4E8ADC387C}" dt="2020-10-19T19:12:16.202" v="13" actId="5736"/>
-      <pc:docMkLst>
-        <pc:docMk/>
-      </pc:docMkLst>
-      <pc:sldChg chg="modSp mod">
-        <pc:chgData name="Andrew Schnitkey" userId="4f2f6332d690fb8f" providerId="LiveId" clId="{4BD5E4C1-7AC0-494F-812D-8F4E8ADC387C}" dt="2020-10-19T19:12:16.202" v="13" actId="5736"/>
-        <pc:sldMkLst>
-          <pc:docMk/>
-          <pc:sldMk cId="769240779" sldId="3309"/>
-        </pc:sldMkLst>
-        <pc:graphicFrameChg chg="mod">
-          <ac:chgData name="Andrew Schnitkey" userId="4f2f6332d690fb8f" providerId="LiveId" clId="{4BD5E4C1-7AC0-494F-812D-8F4E8ADC387C}" dt="2020-10-19T19:12:16.202" v="13" actId="5736"/>
           <ac:graphicFrameMkLst>
             <pc:docMk/>
             <pc:sldMk cId="769240779" sldId="3309"/>
@@ -261,19 +261,19 @@
               <c:strCache>
                 <c:ptCount val="5"/>
                 <c:pt idx="0">
-                  <c:v>Q3 2019</c:v>
+                  <c:v>Q4 2019</c:v>
                 </c:pt>
                 <c:pt idx="1">
-                  <c:v>Q4 2019</c:v>
+                  <c:v>Q1 2020</c:v>
                 </c:pt>
                 <c:pt idx="2">
-                  <c:v>Q1 2020</c:v>
+                  <c:v>Q2 2020</c:v>
                 </c:pt>
                 <c:pt idx="3">
-                  <c:v>Q2 2020</c:v>
+                  <c:v>Q3 2020</c:v>
                 </c:pt>
                 <c:pt idx="4">
-                  <c:v>Q3 2020</c:v>
+                  <c:v>Q4 2020</c:v>
                 </c:pt>
               </c:strCache>
             </c:strRef>
@@ -285,19 +285,19 @@
                 <c:formatCode>General</c:formatCode>
                 <c:ptCount val="5"/>
                 <c:pt idx="0">
-                  <c:v>-2400000</c:v>
+                  <c:v>-87157</c:v>
                 </c:pt>
                 <c:pt idx="1">
-                  <c:v>-87157</c:v>
+                  <c:v>130000</c:v>
                 </c:pt>
                 <c:pt idx="2">
-                  <c:v>130000</c:v>
+                  <c:v>-538000</c:v>
                 </c:pt>
                 <c:pt idx="3">
-                  <c:v>-538000</c:v>
+                  <c:v>-464000</c:v>
                 </c:pt>
                 <c:pt idx="4">
-                  <c:v>-464000</c:v>
+                  <c:v>3300000</c:v>
                 </c:pt>
               </c:numCache>
             </c:numRef>
@@ -356,19 +356,19 @@
               <c:strCache>
                 <c:ptCount val="5"/>
                 <c:pt idx="0">
-                  <c:v>Q3 2019</c:v>
+                  <c:v>Q4 2019</c:v>
                 </c:pt>
                 <c:pt idx="1">
-                  <c:v>Q4 2019</c:v>
+                  <c:v>Q1 2020</c:v>
                 </c:pt>
                 <c:pt idx="2">
-                  <c:v>Q1 2020</c:v>
+                  <c:v>Q2 2020</c:v>
                 </c:pt>
                 <c:pt idx="3">
-                  <c:v>Q2 2020</c:v>
+                  <c:v>Q3 2020</c:v>
                 </c:pt>
                 <c:pt idx="4">
-                  <c:v>Q3 2020</c:v>
+                  <c:v>Q4 2020</c:v>
                 </c:pt>
               </c:strCache>
             </c:strRef>
@@ -383,16 +383,16 @@
                   <c:v>0.05</c:v>
                 </c:pt>
                 <c:pt idx="1">
-                  <c:v>0.05</c:v>
+                  <c:v>5.3999999999999999E-2</c:v>
                 </c:pt>
                 <c:pt idx="2">
-                  <c:v>5.3999999999999999E-2</c:v>
+                  <c:v>6.6000000000000003E-2</c:v>
                 </c:pt>
                 <c:pt idx="3">
-                  <c:v>6.6000000000000003E-2</c:v>
+                  <c:v>7.0999999999999994E-2</c:v>
                 </c:pt>
                 <c:pt idx="4">
-                  <c:v>7.0999999999999994E-2</c:v>
+                  <c:v>7.4999999999999997E-2</c:v>
                 </c:pt>
               </c:numCache>
             </c:numRef>
@@ -518,7 +518,7 @@
         <c:axId val="654996592"/>
         <c:scaling>
           <c:orientation val="minMax"/>
-          <c:max val="7.5000000000000011E-2"/>
+          <c:max val="8.0000000000000016E-2"/>
           <c:min val="4.5000000000000012E-2"/>
         </c:scaling>
         <c:delete val="0"/>
@@ -679,7 +679,7 @@
             <a:fld id="{EFC10EE1-B198-C942-8235-326C972CBB30}" type="datetimeFigureOut">
               <a:rPr lang="en-US" smtClean="0"/>
               <a:pPr/>
-              <a:t>10/19/20</a:t>
+              <a:t>3/9/21</a:t>
             </a:fld>
             <a:endParaRPr lang="en-US" dirty="0"/>
           </a:p>
@@ -1559,7 +1559,7 @@
           <p:nvPr>
             <p:extLst>
               <p:ext uri="{D42A27DB-BD31-4B8C-83A1-F6EECF244321}">
-                <p14:modId xmlns:p14="http://schemas.microsoft.com/office/powerpoint/2010/main" val="3281548069"/>
+                <p14:modId xmlns:p14="http://schemas.microsoft.com/office/powerpoint/2010/main" val="36643644"/>
               </p:ext>
             </p:extLst>
           </p:nvPr>

</xml_diff>

<commit_message>
Updated services pages with 1q21 market data
</commit_message>
<xml_diff>
--- a/marketing/marketreports/industrial_snapshot_template.pptx
+++ b/marketing/marketreports/industrial_snapshot_template.pptx
@@ -142,7 +142,7 @@
 <file path=ppt/revisionInfo.xml><?xml version="1.0" encoding="utf-8"?>
 <p1510:revInfo xmlns:a="http://schemas.openxmlformats.org/drawingml/2006/main" xmlns:r="http://schemas.openxmlformats.org/officeDocument/2006/relationships" xmlns:p1510="http://schemas.microsoft.com/office/powerpoint/2015/10/main">
   <p1510:revLst>
-    <p1510:client id="{4BD5E4C1-7AC0-494F-812D-8F4E8ADC387C}" v="9" dt="2020-10-19T19:12:16.202"/>
+    <p1510:client id="{310F356A-DF8B-6849-B77B-4E655A2FE955}" v="1" dt="2021-05-13T18:32:57.707"/>
   </p1510:revLst>
 </p1510:revInfo>
 </file>
@@ -150,20 +150,20 @@
 <file path=ppt/changesInfos/changesInfo1.xml><?xml version="1.0" encoding="utf-8"?>
 <pc:chgInfo xmlns:a="http://schemas.openxmlformats.org/drawingml/2006/main" xmlns:r="http://schemas.openxmlformats.org/officeDocument/2006/relationships" xmlns:ac="http://schemas.microsoft.com/office/drawing/2013/main/command" xmlns:pc="http://schemas.microsoft.com/office/powerpoint/2013/main/command">
   <pc:docChgLst>
-    <pc:chgData name="Andrew Schnitkey" userId="4f2f6332d690fb8f" providerId="LiveId" clId="{4BD5E4C1-7AC0-494F-812D-8F4E8ADC387C}"/>
+    <pc:chgData name="Andrew Schnitkey" userId="4f2f6332d690fb8f" providerId="LiveId" clId="{310F356A-DF8B-6849-B77B-4E655A2FE955}"/>
     <pc:docChg chg="modSld">
-      <pc:chgData name="Andrew Schnitkey" userId="4f2f6332d690fb8f" providerId="LiveId" clId="{4BD5E4C1-7AC0-494F-812D-8F4E8ADC387C}" dt="2020-10-19T19:12:16.202" v="13" actId="5736"/>
+      <pc:chgData name="Andrew Schnitkey" userId="4f2f6332d690fb8f" providerId="LiveId" clId="{310F356A-DF8B-6849-B77B-4E655A2FE955}" dt="2021-05-13T18:32:57.707" v="5" actId="5736"/>
       <pc:docMkLst>
         <pc:docMk/>
       </pc:docMkLst>
       <pc:sldChg chg="modSp mod">
-        <pc:chgData name="Andrew Schnitkey" userId="4f2f6332d690fb8f" providerId="LiveId" clId="{4BD5E4C1-7AC0-494F-812D-8F4E8ADC387C}" dt="2020-10-19T19:12:16.202" v="13" actId="5736"/>
+        <pc:chgData name="Andrew Schnitkey" userId="4f2f6332d690fb8f" providerId="LiveId" clId="{310F356A-DF8B-6849-B77B-4E655A2FE955}" dt="2021-05-13T18:32:57.707" v="5" actId="5736"/>
         <pc:sldMkLst>
           <pc:docMk/>
           <pc:sldMk cId="769240779" sldId="3309"/>
         </pc:sldMkLst>
         <pc:graphicFrameChg chg="mod">
-          <ac:chgData name="Andrew Schnitkey" userId="4f2f6332d690fb8f" providerId="LiveId" clId="{4BD5E4C1-7AC0-494F-812D-8F4E8ADC387C}" dt="2020-10-19T19:12:16.202" v="13" actId="5736"/>
+          <ac:chgData name="Andrew Schnitkey" userId="4f2f6332d690fb8f" providerId="LiveId" clId="{310F356A-DF8B-6849-B77B-4E655A2FE955}" dt="2021-05-13T18:32:57.707" v="5" actId="5736"/>
           <ac:graphicFrameMkLst>
             <pc:docMk/>
             <pc:sldMk cId="769240779" sldId="3309"/>
@@ -188,6 +188,30 @@
         </pc:sldMkLst>
         <pc:graphicFrameChg chg="mod">
           <ac:chgData name="Andrew Schnitkey" userId="4f2f6332d690fb8f" providerId="LiveId" clId="{081B2901-91DF-2348-8C9D-3498FB649D76}" dt="2020-06-25T15:33:50.831" v="17" actId="5736"/>
+          <ac:graphicFrameMkLst>
+            <pc:docMk/>
+            <pc:sldMk cId="769240779" sldId="3309"/>
+            <ac:graphicFrameMk id="2" creationId="{AE554B24-EC4F-6245-BAC1-E1ED0E9FC0C4}"/>
+          </ac:graphicFrameMkLst>
+        </pc:graphicFrameChg>
+      </pc:sldChg>
+    </pc:docChg>
+  </pc:docChgLst>
+  <pc:docChgLst>
+    <pc:chgData name="Andrew Schnitkey" userId="4f2f6332d690fb8f" providerId="LiveId" clId="{4BD5E4C1-7AC0-494F-812D-8F4E8ADC387C}"/>
+    <pc:docChg chg="modSld">
+      <pc:chgData name="Andrew Schnitkey" userId="4f2f6332d690fb8f" providerId="LiveId" clId="{4BD5E4C1-7AC0-494F-812D-8F4E8ADC387C}" dt="2020-10-19T19:12:16.202" v="13" actId="5736"/>
+      <pc:docMkLst>
+        <pc:docMk/>
+      </pc:docMkLst>
+      <pc:sldChg chg="modSp mod">
+        <pc:chgData name="Andrew Schnitkey" userId="4f2f6332d690fb8f" providerId="LiveId" clId="{4BD5E4C1-7AC0-494F-812D-8F4E8ADC387C}" dt="2020-10-19T19:12:16.202" v="13" actId="5736"/>
+        <pc:sldMkLst>
+          <pc:docMk/>
+          <pc:sldMk cId="769240779" sldId="3309"/>
+        </pc:sldMkLst>
+        <pc:graphicFrameChg chg="mod">
+          <ac:chgData name="Andrew Schnitkey" userId="4f2f6332d690fb8f" providerId="LiveId" clId="{4BD5E4C1-7AC0-494F-812D-8F4E8ADC387C}" dt="2020-10-19T19:12:16.202" v="13" actId="5736"/>
           <ac:graphicFrameMkLst>
             <pc:docMk/>
             <pc:sldMk cId="769240779" sldId="3309"/>
@@ -261,19 +285,19 @@
               <c:strCache>
                 <c:ptCount val="5"/>
                 <c:pt idx="0">
-                  <c:v>Q4 2019</c:v>
+                  <c:v>Q1 2020</c:v>
                 </c:pt>
                 <c:pt idx="1">
-                  <c:v>Q1 2020</c:v>
+                  <c:v>Q2 2020</c:v>
                 </c:pt>
                 <c:pt idx="2">
-                  <c:v>Q2 2020</c:v>
+                  <c:v>Q3 2020</c:v>
                 </c:pt>
                 <c:pt idx="3">
-                  <c:v>Q3 2020</c:v>
+                  <c:v>Q4 2020</c:v>
                 </c:pt>
                 <c:pt idx="4">
-                  <c:v>Q4 2020</c:v>
+                  <c:v>Q1 2021</c:v>
                 </c:pt>
               </c:strCache>
             </c:strRef>
@@ -285,16 +309,16 @@
                 <c:formatCode>General</c:formatCode>
                 <c:ptCount val="5"/>
                 <c:pt idx="0">
-                  <c:v>-87157</c:v>
+                  <c:v>130000</c:v>
                 </c:pt>
                 <c:pt idx="1">
-                  <c:v>130000</c:v>
+                  <c:v>-538000</c:v>
                 </c:pt>
                 <c:pt idx="2">
-                  <c:v>-538000</c:v>
+                  <c:v>-464000</c:v>
                 </c:pt>
                 <c:pt idx="3">
-                  <c:v>-464000</c:v>
+                  <c:v>3300000</c:v>
                 </c:pt>
                 <c:pt idx="4">
                   <c:v>3300000</c:v>
@@ -356,19 +380,19 @@
               <c:strCache>
                 <c:ptCount val="5"/>
                 <c:pt idx="0">
-                  <c:v>Q4 2019</c:v>
+                  <c:v>Q1 2020</c:v>
                 </c:pt>
                 <c:pt idx="1">
-                  <c:v>Q1 2020</c:v>
+                  <c:v>Q2 2020</c:v>
                 </c:pt>
                 <c:pt idx="2">
-                  <c:v>Q2 2020</c:v>
+                  <c:v>Q3 2020</c:v>
                 </c:pt>
                 <c:pt idx="3">
-                  <c:v>Q3 2020</c:v>
+                  <c:v>Q4 2020</c:v>
                 </c:pt>
                 <c:pt idx="4">
-                  <c:v>Q4 2020</c:v>
+                  <c:v>Q1 2021</c:v>
                 </c:pt>
               </c:strCache>
             </c:strRef>
@@ -380,19 +404,19 @@
                 <c:formatCode>0.00%</c:formatCode>
                 <c:ptCount val="5"/>
                 <c:pt idx="0">
-                  <c:v>0.05</c:v>
+                  <c:v>5.3999999999999999E-2</c:v>
                 </c:pt>
                 <c:pt idx="1">
-                  <c:v>5.3999999999999999E-2</c:v>
+                  <c:v>6.6000000000000003E-2</c:v>
                 </c:pt>
                 <c:pt idx="2">
-                  <c:v>6.6000000000000003E-2</c:v>
+                  <c:v>7.0999999999999994E-2</c:v>
                 </c:pt>
                 <c:pt idx="3">
-                  <c:v>7.0999999999999994E-2</c:v>
+                  <c:v>7.4999999999999997E-2</c:v>
                 </c:pt>
                 <c:pt idx="4">
-                  <c:v>7.4999999999999997E-2</c:v>
+                  <c:v>5.3999999999999999E-2</c:v>
                 </c:pt>
               </c:numCache>
             </c:numRef>
@@ -679,7 +703,7 @@
             <a:fld id="{EFC10EE1-B198-C942-8235-326C972CBB30}" type="datetimeFigureOut">
               <a:rPr lang="en-US" smtClean="0"/>
               <a:pPr/>
-              <a:t>3/9/21</a:t>
+              <a:t>5/13/21</a:t>
             </a:fld>
             <a:endParaRPr lang="en-US" dirty="0"/>
           </a:p>
@@ -1559,7 +1583,7 @@
           <p:nvPr>
             <p:extLst>
               <p:ext uri="{D42A27DB-BD31-4B8C-83A1-F6EECF244321}">
-                <p14:modId xmlns:p14="http://schemas.microsoft.com/office/powerpoint/2010/main" val="36643644"/>
+                <p14:modId xmlns:p14="http://schemas.microsoft.com/office/powerpoint/2010/main" val="544701496"/>
               </p:ext>
             </p:extLst>
           </p:nvPr>

</xml_diff>

<commit_message>
Updated services with latest market report data
</commit_message>
<xml_diff>
--- a/marketing/marketreports/industrial_snapshot_template.pptx
+++ b/marketing/marketreports/industrial_snapshot_template.pptx
@@ -142,7 +142,7 @@
 <file path=ppt/revisionInfo.xml><?xml version="1.0" encoding="utf-8"?>
 <p1510:revInfo xmlns:a="http://schemas.openxmlformats.org/drawingml/2006/main" xmlns:r="http://schemas.openxmlformats.org/officeDocument/2006/relationships" xmlns:p1510="http://schemas.microsoft.com/office/powerpoint/2015/10/main">
   <p1510:revLst>
-    <p1510:client id="{310F356A-DF8B-6849-B77B-4E655A2FE955}" v="1" dt="2021-05-13T18:32:57.707"/>
+    <p1510:client id="{E69BDB3A-A661-684D-A724-303667976F62}" v="8" dt="2021-07-28T15:34:24.093"/>
   </p1510:revLst>
 </p1510:revInfo>
 </file>
@@ -164,6 +164,30 @@
         </pc:sldMkLst>
         <pc:graphicFrameChg chg="mod">
           <ac:chgData name="Andrew Schnitkey" userId="4f2f6332d690fb8f" providerId="LiveId" clId="{310F356A-DF8B-6849-B77B-4E655A2FE955}" dt="2021-05-13T18:32:57.707" v="5" actId="5736"/>
+          <ac:graphicFrameMkLst>
+            <pc:docMk/>
+            <pc:sldMk cId="769240779" sldId="3309"/>
+            <ac:graphicFrameMk id="2" creationId="{AE554B24-EC4F-6245-BAC1-E1ED0E9FC0C4}"/>
+          </ac:graphicFrameMkLst>
+        </pc:graphicFrameChg>
+      </pc:sldChg>
+    </pc:docChg>
+  </pc:docChgLst>
+  <pc:docChgLst>
+    <pc:chgData name="Andrew Schnitkey" userId="4f2f6332d690fb8f" providerId="LiveId" clId="{E69BDB3A-A661-684D-A724-303667976F62}"/>
+    <pc:docChg chg="modSld">
+      <pc:chgData name="Andrew Schnitkey" userId="4f2f6332d690fb8f" providerId="LiveId" clId="{E69BDB3A-A661-684D-A724-303667976F62}" dt="2021-07-28T15:34:24.093" v="10" actId="5736"/>
+      <pc:docMkLst>
+        <pc:docMk/>
+      </pc:docMkLst>
+      <pc:sldChg chg="modSp mod">
+        <pc:chgData name="Andrew Schnitkey" userId="4f2f6332d690fb8f" providerId="LiveId" clId="{E69BDB3A-A661-684D-A724-303667976F62}" dt="2021-07-28T15:34:24.093" v="10" actId="5736"/>
+        <pc:sldMkLst>
+          <pc:docMk/>
+          <pc:sldMk cId="769240779" sldId="3309"/>
+        </pc:sldMkLst>
+        <pc:graphicFrameChg chg="mod">
+          <ac:chgData name="Andrew Schnitkey" userId="4f2f6332d690fb8f" providerId="LiveId" clId="{E69BDB3A-A661-684D-A724-303667976F62}" dt="2021-07-28T15:34:24.093" v="10" actId="5736"/>
           <ac:graphicFrameMkLst>
             <pc:docMk/>
             <pc:sldMk cId="769240779" sldId="3309"/>
@@ -285,19 +309,19 @@
               <c:strCache>
                 <c:ptCount val="5"/>
                 <c:pt idx="0">
-                  <c:v>Q1 2020</c:v>
+                  <c:v>Q2 2020</c:v>
                 </c:pt>
                 <c:pt idx="1">
-                  <c:v>Q2 2020</c:v>
+                  <c:v>Q3 2020</c:v>
                 </c:pt>
                 <c:pt idx="2">
-                  <c:v>Q3 2020</c:v>
+                  <c:v>Q4 2020</c:v>
                 </c:pt>
                 <c:pt idx="3">
-                  <c:v>Q4 2020</c:v>
+                  <c:v>Q1 2021</c:v>
                 </c:pt>
                 <c:pt idx="4">
-                  <c:v>Q1 2021</c:v>
+                  <c:v>Q2 2021</c:v>
                 </c:pt>
               </c:strCache>
             </c:strRef>
@@ -309,19 +333,19 @@
                 <c:formatCode>General</c:formatCode>
                 <c:ptCount val="5"/>
                 <c:pt idx="0">
-                  <c:v>130000</c:v>
+                  <c:v>-538000</c:v>
                 </c:pt>
                 <c:pt idx="1">
-                  <c:v>-538000</c:v>
+                  <c:v>-464000</c:v>
                 </c:pt>
                 <c:pt idx="2">
-                  <c:v>-464000</c:v>
+                  <c:v>3300000</c:v>
                 </c:pt>
                 <c:pt idx="3">
                   <c:v>3300000</c:v>
                 </c:pt>
                 <c:pt idx="4">
-                  <c:v>3300000</c:v>
+                  <c:v>650000</c:v>
                 </c:pt>
               </c:numCache>
             </c:numRef>
@@ -380,19 +404,19 @@
               <c:strCache>
                 <c:ptCount val="5"/>
                 <c:pt idx="0">
-                  <c:v>Q1 2020</c:v>
+                  <c:v>Q2 2020</c:v>
                 </c:pt>
                 <c:pt idx="1">
-                  <c:v>Q2 2020</c:v>
+                  <c:v>Q3 2020</c:v>
                 </c:pt>
                 <c:pt idx="2">
-                  <c:v>Q3 2020</c:v>
+                  <c:v>Q4 2020</c:v>
                 </c:pt>
                 <c:pt idx="3">
-                  <c:v>Q4 2020</c:v>
+                  <c:v>Q1 2021</c:v>
                 </c:pt>
                 <c:pt idx="4">
-                  <c:v>Q1 2021</c:v>
+                  <c:v>Q2 2021</c:v>
                 </c:pt>
               </c:strCache>
             </c:strRef>
@@ -404,19 +428,19 @@
                 <c:formatCode>0.00%</c:formatCode>
                 <c:ptCount val="5"/>
                 <c:pt idx="0">
+                  <c:v>6.6000000000000003E-2</c:v>
+                </c:pt>
+                <c:pt idx="1">
+                  <c:v>7.0999999999999994E-2</c:v>
+                </c:pt>
+                <c:pt idx="2">
+                  <c:v>7.4999999999999997E-2</c:v>
+                </c:pt>
+                <c:pt idx="3">
                   <c:v>5.3999999999999999E-2</c:v>
                 </c:pt>
-                <c:pt idx="1">
-                  <c:v>6.6000000000000003E-2</c:v>
-                </c:pt>
-                <c:pt idx="2">
-                  <c:v>7.0999999999999994E-2</c:v>
-                </c:pt>
-                <c:pt idx="3">
-                  <c:v>7.4999999999999997E-2</c:v>
-                </c:pt>
                 <c:pt idx="4">
-                  <c:v>5.3999999999999999E-2</c:v>
+                  <c:v>5.7000000000000002E-2</c:v>
                 </c:pt>
               </c:numCache>
             </c:numRef>
@@ -537,13 +561,14 @@
         <c:crossAx val="-1808985568"/>
         <c:crossesAt val="1"/>
         <c:crossBetween val="between"/>
+        <c:majorUnit val="1000000"/>
       </c:valAx>
       <c:valAx>
         <c:axId val="654996592"/>
         <c:scaling>
           <c:orientation val="minMax"/>
-          <c:max val="8.0000000000000016E-2"/>
-          <c:min val="4.5000000000000012E-2"/>
+          <c:max val="7.8000000000000014E-2"/>
+          <c:min val="5.2000000000000011E-2"/>
         </c:scaling>
         <c:delete val="0"/>
         <c:axPos val="r"/>
@@ -567,6 +592,7 @@
         <c:crossAx val="609049744"/>
         <c:crosses val="max"/>
         <c:crossBetween val="between"/>
+        <c:majorUnit val="5.000000000000001E-3"/>
       </c:valAx>
       <c:catAx>
         <c:axId val="609049744"/>
@@ -703,7 +729,7 @@
             <a:fld id="{EFC10EE1-B198-C942-8235-326C972CBB30}" type="datetimeFigureOut">
               <a:rPr lang="en-US" smtClean="0"/>
               <a:pPr/>
-              <a:t>5/13/21</a:t>
+              <a:t>7/28/21</a:t>
             </a:fld>
             <a:endParaRPr lang="en-US" dirty="0"/>
           </a:p>
@@ -1583,7 +1609,7 @@
           <p:nvPr>
             <p:extLst>
               <p:ext uri="{D42A27DB-BD31-4B8C-83A1-F6EECF244321}">
-                <p14:modId xmlns:p14="http://schemas.microsoft.com/office/powerpoint/2010/main" val="544701496"/>
+                <p14:modId xmlns:p14="http://schemas.microsoft.com/office/powerpoint/2010/main" val="2168666450"/>
               </p:ext>
             </p:extLst>
           </p:nvPr>

</xml_diff>

<commit_message>
Updated services pages with q3 market reports
</commit_message>
<xml_diff>
--- a/marketing/marketreports/industrial_snapshot_template.pptx
+++ b/marketing/marketreports/industrial_snapshot_template.pptx
@@ -142,7 +142,7 @@
 <file path=ppt/revisionInfo.xml><?xml version="1.0" encoding="utf-8"?>
 <p1510:revInfo xmlns:a="http://schemas.openxmlformats.org/drawingml/2006/main" xmlns:r="http://schemas.openxmlformats.org/officeDocument/2006/relationships" xmlns:p1510="http://schemas.microsoft.com/office/powerpoint/2015/10/main">
   <p1510:revLst>
-    <p1510:client id="{E69BDB3A-A661-684D-A724-303667976F62}" v="8" dt="2021-07-28T15:34:24.093"/>
+    <p1510:client id="{7BCF2BD4-9CA3-F74F-B97A-71237F04332B}" v="2" dt="2021-10-20T15:27:51.794"/>
   </p1510:revLst>
 </p1510:revInfo>
 </file>
@@ -245,6 +245,30 @@
       </pc:sldChg>
     </pc:docChg>
   </pc:docChgLst>
+  <pc:docChgLst>
+    <pc:chgData name="Andrew Schnitkey" userId="4f2f6332d690fb8f" providerId="LiveId" clId="{7BCF2BD4-9CA3-F74F-B97A-71237F04332B}"/>
+    <pc:docChg chg="modSld">
+      <pc:chgData name="Andrew Schnitkey" userId="4f2f6332d690fb8f" providerId="LiveId" clId="{7BCF2BD4-9CA3-F74F-B97A-71237F04332B}" dt="2021-10-20T15:27:51.793" v="6" actId="5736"/>
+      <pc:docMkLst>
+        <pc:docMk/>
+      </pc:docMkLst>
+      <pc:sldChg chg="modSp mod">
+        <pc:chgData name="Andrew Schnitkey" userId="4f2f6332d690fb8f" providerId="LiveId" clId="{7BCF2BD4-9CA3-F74F-B97A-71237F04332B}" dt="2021-10-20T15:27:51.793" v="6" actId="5736"/>
+        <pc:sldMkLst>
+          <pc:docMk/>
+          <pc:sldMk cId="769240779" sldId="3309"/>
+        </pc:sldMkLst>
+        <pc:graphicFrameChg chg="mod">
+          <ac:chgData name="Andrew Schnitkey" userId="4f2f6332d690fb8f" providerId="LiveId" clId="{7BCF2BD4-9CA3-F74F-B97A-71237F04332B}" dt="2021-10-20T15:27:51.793" v="6" actId="5736"/>
+          <ac:graphicFrameMkLst>
+            <pc:docMk/>
+            <pc:sldMk cId="769240779" sldId="3309"/>
+            <ac:graphicFrameMk id="2" creationId="{AE554B24-EC4F-6245-BAC1-E1ED0E9FC0C4}"/>
+          </ac:graphicFrameMkLst>
+        </pc:graphicFrameChg>
+      </pc:sldChg>
+    </pc:docChg>
+  </pc:docChgLst>
 </pc:chgInfo>
 </file>
 
@@ -309,19 +333,19 @@
               <c:strCache>
                 <c:ptCount val="5"/>
                 <c:pt idx="0">
-                  <c:v>Q2 2020</c:v>
+                  <c:v>Q3 2020</c:v>
                 </c:pt>
                 <c:pt idx="1">
-                  <c:v>Q3 2020</c:v>
+                  <c:v>Q4 2020</c:v>
                 </c:pt>
                 <c:pt idx="2">
-                  <c:v>Q4 2020</c:v>
+                  <c:v>Q1 2021</c:v>
                 </c:pt>
                 <c:pt idx="3">
-                  <c:v>Q1 2021</c:v>
+                  <c:v>Q2 2021</c:v>
                 </c:pt>
                 <c:pt idx="4">
-                  <c:v>Q2 2021</c:v>
+                  <c:v>Q3 2021</c:v>
                 </c:pt>
               </c:strCache>
             </c:strRef>
@@ -333,19 +357,19 @@
                 <c:formatCode>General</c:formatCode>
                 <c:ptCount val="5"/>
                 <c:pt idx="0">
-                  <c:v>-538000</c:v>
+                  <c:v>-464000</c:v>
                 </c:pt>
                 <c:pt idx="1">
-                  <c:v>-464000</c:v>
+                  <c:v>3300000</c:v>
                 </c:pt>
                 <c:pt idx="2">
                   <c:v>3300000</c:v>
                 </c:pt>
                 <c:pt idx="3">
-                  <c:v>3300000</c:v>
+                  <c:v>650000</c:v>
                 </c:pt>
                 <c:pt idx="4">
-                  <c:v>650000</c:v>
+                  <c:v>4400000</c:v>
                 </c:pt>
               </c:numCache>
             </c:numRef>
@@ -404,19 +428,19 @@
               <c:strCache>
                 <c:ptCount val="5"/>
                 <c:pt idx="0">
-                  <c:v>Q2 2020</c:v>
+                  <c:v>Q3 2020</c:v>
                 </c:pt>
                 <c:pt idx="1">
-                  <c:v>Q3 2020</c:v>
+                  <c:v>Q4 2020</c:v>
                 </c:pt>
                 <c:pt idx="2">
-                  <c:v>Q4 2020</c:v>
+                  <c:v>Q1 2021</c:v>
                 </c:pt>
                 <c:pt idx="3">
-                  <c:v>Q1 2021</c:v>
+                  <c:v>Q2 2021</c:v>
                 </c:pt>
                 <c:pt idx="4">
-                  <c:v>Q2 2021</c:v>
+                  <c:v>Q3 2021</c:v>
                 </c:pt>
               </c:strCache>
             </c:strRef>
@@ -428,19 +452,19 @@
                 <c:formatCode>0.00%</c:formatCode>
                 <c:ptCount val="5"/>
                 <c:pt idx="0">
-                  <c:v>6.6000000000000003E-2</c:v>
+                  <c:v>7.0999999999999994E-2</c:v>
                 </c:pt>
                 <c:pt idx="1">
-                  <c:v>7.0999999999999994E-2</c:v>
+                  <c:v>7.4999999999999997E-2</c:v>
                 </c:pt>
                 <c:pt idx="2">
-                  <c:v>7.4999999999999997E-2</c:v>
+                  <c:v>5.3999999999999999E-2</c:v>
                 </c:pt>
                 <c:pt idx="3">
-                  <c:v>5.3999999999999999E-2</c:v>
+                  <c:v>5.7000000000000002E-2</c:v>
                 </c:pt>
                 <c:pt idx="4">
-                  <c:v>5.7000000000000002E-2</c:v>
+                  <c:v>4.5999999999999999E-2</c:v>
                 </c:pt>
               </c:numCache>
             </c:numRef>
@@ -568,7 +592,7 @@
         <c:scaling>
           <c:orientation val="minMax"/>
           <c:max val="7.8000000000000014E-2"/>
-          <c:min val="5.2000000000000011E-2"/>
+          <c:min val="4.5000000000000012E-2"/>
         </c:scaling>
         <c:delete val="0"/>
         <c:axPos val="r"/>
@@ -729,7 +753,7 @@
             <a:fld id="{EFC10EE1-B198-C942-8235-326C972CBB30}" type="datetimeFigureOut">
               <a:rPr lang="en-US" smtClean="0"/>
               <a:pPr/>
-              <a:t>7/28/21</a:t>
+              <a:t>10/20/21</a:t>
             </a:fld>
             <a:endParaRPr lang="en-US" dirty="0"/>
           </a:p>
@@ -1609,7 +1633,7 @@
           <p:nvPr>
             <p:extLst>
               <p:ext uri="{D42A27DB-BD31-4B8C-83A1-F6EECF244321}">
-                <p14:modId xmlns:p14="http://schemas.microsoft.com/office/powerpoint/2010/main" val="2168666450"/>
+                <p14:modId xmlns:p14="http://schemas.microsoft.com/office/powerpoint/2010/main" val="1507759604"/>
               </p:ext>
             </p:extLst>
           </p:nvPr>

</xml_diff>